<commit_message>
finished lessons and slides, created zip
</commit_message>
<xml_diff>
--- a/slides/Shiny_ResBazSydney2018.pptx
+++ b/slides/Shiny_ResBazSydney2018.pptx
@@ -5,7 +5,7 @@
     <p:sldMasterId id="2147483648" r:id="rId1"/>
   </p:sldMasterIdLst>
   <p:notesMasterIdLst>
-    <p:notesMasterId r:id="rId13"/>
+    <p:notesMasterId r:id="rId16"/>
   </p:notesMasterIdLst>
   <p:sldIdLst>
     <p:sldId id="256" r:id="rId2"/>
@@ -19,6 +19,9 @@
     <p:sldId id="265" r:id="rId10"/>
     <p:sldId id="266" r:id="rId11"/>
     <p:sldId id="267" r:id="rId12"/>
+    <p:sldId id="268" r:id="rId13"/>
+    <p:sldId id="269" r:id="rId14"/>
+    <p:sldId id="270" r:id="rId15"/>
   </p:sldIdLst>
   <p:sldSz cx="12192000" cy="6858000"/>
   <p:notesSz cx="6858000" cy="9144000"/>
@@ -914,6 +917,174 @@
     <p:extLst>
       <p:ext uri="{BB962C8B-B14F-4D97-AF65-F5344CB8AC3E}">
         <p14:creationId xmlns:p14="http://schemas.microsoft.com/office/powerpoint/2010/main" val="778133723"/>
+      </p:ext>
+    </p:extLst>
+  </p:cSld>
+  <p:clrMapOvr>
+    <a:masterClrMapping/>
+  </p:clrMapOvr>
+</p:notes>
+</file>
+
+<file path=ppt/notesSlides/notesSlide5.xml><?xml version="1.0" encoding="utf-8"?>
+<p:notes xmlns:a="http://schemas.openxmlformats.org/drawingml/2006/main" xmlns:r="http://schemas.openxmlformats.org/officeDocument/2006/relationships" xmlns:p="http://schemas.openxmlformats.org/presentationml/2006/main">
+  <p:cSld>
+    <p:spTree>
+      <p:nvGrpSpPr>
+        <p:cNvPr id="1" name=""/>
+        <p:cNvGrpSpPr/>
+        <p:nvPr/>
+      </p:nvGrpSpPr>
+      <p:grpSpPr>
+        <a:xfrm>
+          <a:off x="0" y="0"/>
+          <a:ext cx="0" cy="0"/>
+          <a:chOff x="0" y="0"/>
+          <a:chExt cx="0" cy="0"/>
+        </a:xfrm>
+      </p:grpSpPr>
+      <p:sp>
+        <p:nvSpPr>
+          <p:cNvPr id="2" name="Slide Image Placeholder 1"/>
+          <p:cNvSpPr>
+            <a:spLocks noGrp="1" noRot="1" noChangeAspect="1"/>
+          </p:cNvSpPr>
+          <p:nvPr>
+            <p:ph type="sldImg"/>
+          </p:nvPr>
+        </p:nvSpPr>
+        <p:spPr/>
+      </p:sp>
+      <p:sp>
+        <p:nvSpPr>
+          <p:cNvPr id="3" name="Notes Placeholder 2"/>
+          <p:cNvSpPr>
+            <a:spLocks noGrp="1"/>
+          </p:cNvSpPr>
+          <p:nvPr>
+            <p:ph type="body" idx="1"/>
+          </p:nvPr>
+        </p:nvSpPr>
+        <p:spPr/>
+        <p:txBody>
+          <a:bodyPr/>
+          <a:lstStyle/>
+          <a:p>
+            <a:endParaRPr lang="en-AU" dirty="0"/>
+          </a:p>
+        </p:txBody>
+      </p:sp>
+      <p:sp>
+        <p:nvSpPr>
+          <p:cNvPr id="4" name="Slide Number Placeholder 3"/>
+          <p:cNvSpPr>
+            <a:spLocks noGrp="1"/>
+          </p:cNvSpPr>
+          <p:nvPr>
+            <p:ph type="sldNum" sz="quarter" idx="10"/>
+          </p:nvPr>
+        </p:nvSpPr>
+        <p:spPr/>
+        <p:txBody>
+          <a:bodyPr/>
+          <a:lstStyle/>
+          <a:p>
+            <a:fld id="{0A8ECEB5-AFC0-4DE9-925F-C0F1DBBD20C6}" type="slidenum">
+              <a:rPr lang="en-AU" smtClean="0"/>
+              <a:t>13</a:t>
+            </a:fld>
+            <a:endParaRPr lang="en-AU"/>
+          </a:p>
+        </p:txBody>
+      </p:sp>
+    </p:spTree>
+    <p:extLst>
+      <p:ext uri="{BB962C8B-B14F-4D97-AF65-F5344CB8AC3E}">
+        <p14:creationId xmlns:p14="http://schemas.microsoft.com/office/powerpoint/2010/main" val="2505532153"/>
+      </p:ext>
+    </p:extLst>
+  </p:cSld>
+  <p:clrMapOvr>
+    <a:masterClrMapping/>
+  </p:clrMapOvr>
+</p:notes>
+</file>
+
+<file path=ppt/notesSlides/notesSlide6.xml><?xml version="1.0" encoding="utf-8"?>
+<p:notes xmlns:a="http://schemas.openxmlformats.org/drawingml/2006/main" xmlns:r="http://schemas.openxmlformats.org/officeDocument/2006/relationships" xmlns:p="http://schemas.openxmlformats.org/presentationml/2006/main">
+  <p:cSld>
+    <p:spTree>
+      <p:nvGrpSpPr>
+        <p:cNvPr id="1" name=""/>
+        <p:cNvGrpSpPr/>
+        <p:nvPr/>
+      </p:nvGrpSpPr>
+      <p:grpSpPr>
+        <a:xfrm>
+          <a:off x="0" y="0"/>
+          <a:ext cx="0" cy="0"/>
+          <a:chOff x="0" y="0"/>
+          <a:chExt cx="0" cy="0"/>
+        </a:xfrm>
+      </p:grpSpPr>
+      <p:sp>
+        <p:nvSpPr>
+          <p:cNvPr id="2" name="Slide Image Placeholder 1"/>
+          <p:cNvSpPr>
+            <a:spLocks noGrp="1" noRot="1" noChangeAspect="1"/>
+          </p:cNvSpPr>
+          <p:nvPr>
+            <p:ph type="sldImg"/>
+          </p:nvPr>
+        </p:nvSpPr>
+        <p:spPr/>
+      </p:sp>
+      <p:sp>
+        <p:nvSpPr>
+          <p:cNvPr id="3" name="Notes Placeholder 2"/>
+          <p:cNvSpPr>
+            <a:spLocks noGrp="1"/>
+          </p:cNvSpPr>
+          <p:nvPr>
+            <p:ph type="body" idx="1"/>
+          </p:nvPr>
+        </p:nvSpPr>
+        <p:spPr/>
+        <p:txBody>
+          <a:bodyPr/>
+          <a:lstStyle/>
+          <a:p>
+            <a:endParaRPr lang="en-AU" dirty="0"/>
+          </a:p>
+        </p:txBody>
+      </p:sp>
+      <p:sp>
+        <p:nvSpPr>
+          <p:cNvPr id="4" name="Slide Number Placeholder 3"/>
+          <p:cNvSpPr>
+            <a:spLocks noGrp="1"/>
+          </p:cNvSpPr>
+          <p:nvPr>
+            <p:ph type="sldNum" sz="quarter" idx="10"/>
+          </p:nvPr>
+        </p:nvSpPr>
+        <p:spPr/>
+        <p:txBody>
+          <a:bodyPr/>
+          <a:lstStyle/>
+          <a:p>
+            <a:fld id="{0A8ECEB5-AFC0-4DE9-925F-C0F1DBBD20C6}" type="slidenum">
+              <a:rPr lang="en-AU" smtClean="0"/>
+              <a:t>14</a:t>
+            </a:fld>
+            <a:endParaRPr lang="en-AU"/>
+          </a:p>
+        </p:txBody>
+      </p:sp>
+    </p:spTree>
+    <p:extLst>
+      <p:ext uri="{BB962C8B-B14F-4D97-AF65-F5344CB8AC3E}">
+        <p14:creationId xmlns:p14="http://schemas.microsoft.com/office/powerpoint/2010/main" val="1766800784"/>
       </p:ext>
     </p:extLst>
   </p:cSld>
@@ -4251,8 +4422,8 @@
         </p:nvSpPr>
         <p:spPr>
           <a:xfrm>
-            <a:off x="469900" y="1825625"/>
-            <a:ext cx="5816600" cy="4351338"/>
+            <a:off x="358140" y="1825625"/>
+            <a:ext cx="5928360" cy="4351338"/>
           </a:xfrm>
         </p:spPr>
         <p:txBody>
@@ -4262,20 +4433,20 @@
             <a:r>
               <a:rPr lang="en-AU" dirty="0"/>
               <a:t>Load up </a:t>
-            </a:r>
-            <a:r>
-              <a:rPr lang="en-AU" dirty="0">
-                <a:latin typeface="Consolas" panose="020B0609020204030204" pitchFamily="49" charset="0"/>
-                <a:cs typeface="Courier New" panose="02070309020205020404" pitchFamily="49" charset="0"/>
-              </a:rPr>
-              <a:t>lesson2_under_the_hood</a:t>
             </a:r>
             <a:r>
               <a:rPr lang="en-AU" dirty="0" smtClean="0">
                 <a:latin typeface="Consolas" panose="020B0609020204030204" pitchFamily="49" charset="0"/>
                 <a:cs typeface="Courier New" panose="02070309020205020404" pitchFamily="49" charset="0"/>
               </a:rPr>
-              <a:t>/ lesson2_basic_data_explorer_TEMPLATE.R</a:t>
+              <a:t>lesson2_basic_data_explorer/ </a:t>
+            </a:r>
+            <a:r>
+              <a:rPr lang="en-AU" dirty="0" smtClean="0">
+                <a:latin typeface="Consolas" panose="020B0609020204030204" pitchFamily="49" charset="0"/>
+                <a:cs typeface="Courier New" panose="02070309020205020404" pitchFamily="49" charset="0"/>
+              </a:rPr>
+              <a:t>lesson2_basic_data_explorer_TEMPLATE.R</a:t>
             </a:r>
             <a:r>
               <a:rPr lang="en-AU" dirty="0" smtClean="0">
@@ -4302,7 +4473,25 @@
           <a:p>
             <a:r>
               <a:rPr lang="en-AU" dirty="0" smtClean="0"/>
-              <a:t>We’ll build our first app!</a:t>
+              <a:t>We’ll build our first app</a:t>
+            </a:r>
+            <a:r>
+              <a:rPr lang="en-AU" dirty="0" smtClean="0"/>
+              <a:t>!</a:t>
+            </a:r>
+          </a:p>
+          <a:p>
+            <a:r>
+              <a:rPr lang="en-AU" dirty="0"/>
+              <a:t>Exercise</a:t>
+            </a:r>
+            <a:r>
+              <a:rPr lang="en-AU" dirty="0" smtClean="0"/>
+              <a:t>: </a:t>
+            </a:r>
+            <a:r>
+              <a:rPr lang="en-AU" dirty="0"/>
+              <a:t>add functionality to select a variable to colour points or change point shapes</a:t>
             </a:r>
             <a:endParaRPr lang="en-AU" dirty="0"/>
           </a:p>
@@ -4345,6 +4534,2196 @@
 </p:sld>
 </file>
 
+<file path=ppt/slides/slide12.xml><?xml version="1.0" encoding="utf-8"?>
+<p:sld xmlns:a="http://schemas.openxmlformats.org/drawingml/2006/main" xmlns:r="http://schemas.openxmlformats.org/officeDocument/2006/relationships" xmlns:p="http://schemas.openxmlformats.org/presentationml/2006/main">
+  <p:cSld>
+    <p:spTree>
+      <p:nvGrpSpPr>
+        <p:cNvPr id="1" name=""/>
+        <p:cNvGrpSpPr/>
+        <p:nvPr/>
+      </p:nvGrpSpPr>
+      <p:grpSpPr>
+        <a:xfrm>
+          <a:off x="0" y="0"/>
+          <a:ext cx="0" cy="0"/>
+          <a:chOff x="0" y="0"/>
+          <a:chExt cx="0" cy="0"/>
+        </a:xfrm>
+      </p:grpSpPr>
+      <p:sp>
+        <p:nvSpPr>
+          <p:cNvPr id="2" name="Title 1"/>
+          <p:cNvSpPr>
+            <a:spLocks noGrp="1"/>
+          </p:cNvSpPr>
+          <p:nvPr>
+            <p:ph type="title"/>
+          </p:nvPr>
+        </p:nvSpPr>
+        <p:spPr/>
+        <p:txBody>
+          <a:bodyPr/>
+          <a:lstStyle/>
+          <a:p>
+            <a:r>
+              <a:rPr lang="en-AU" dirty="0" smtClean="0"/>
+              <a:t>Lesson 3 – add interactivity to data explorer</a:t>
+            </a:r>
+            <a:endParaRPr lang="en-AU" dirty="0"/>
+          </a:p>
+        </p:txBody>
+      </p:sp>
+      <p:sp>
+        <p:nvSpPr>
+          <p:cNvPr id="3" name="Content Placeholder 2"/>
+          <p:cNvSpPr>
+            <a:spLocks noGrp="1"/>
+          </p:cNvSpPr>
+          <p:nvPr>
+            <p:ph idx="1"/>
+          </p:nvPr>
+        </p:nvSpPr>
+        <p:spPr/>
+        <p:txBody>
+          <a:bodyPr/>
+          <a:lstStyle/>
+          <a:p>
+            <a:r>
+              <a:rPr lang="en-AU" dirty="0" smtClean="0"/>
+              <a:t>Our first app was a one trick pony – lets generalise it to use other datasets!</a:t>
+            </a:r>
+          </a:p>
+          <a:p>
+            <a:endParaRPr lang="en-AU" dirty="0"/>
+          </a:p>
+        </p:txBody>
+      </p:sp>
+      <p:pic>
+        <p:nvPicPr>
+          <p:cNvPr id="7" name="Picture 6"/>
+          <p:cNvPicPr>
+            <a:picLocks noChangeAspect="1"/>
+          </p:cNvPicPr>
+          <p:nvPr/>
+        </p:nvPicPr>
+        <p:blipFill>
+          <a:blip r:embed="rId2"/>
+          <a:stretch>
+            <a:fillRect/>
+          </a:stretch>
+        </p:blipFill>
+        <p:spPr>
+          <a:xfrm>
+            <a:off x="3244132" y="2602797"/>
+            <a:ext cx="6344302" cy="4124007"/>
+          </a:xfrm>
+          <a:prstGeom prst="rect">
+            <a:avLst/>
+          </a:prstGeom>
+        </p:spPr>
+      </p:pic>
+    </p:spTree>
+    <p:extLst>
+      <p:ext uri="{BB962C8B-B14F-4D97-AF65-F5344CB8AC3E}">
+        <p14:creationId xmlns:p14="http://schemas.microsoft.com/office/powerpoint/2010/main" val="2553446459"/>
+      </p:ext>
+    </p:extLst>
+  </p:cSld>
+  <p:clrMapOvr>
+    <a:masterClrMapping/>
+  </p:clrMapOvr>
+</p:sld>
+</file>
+
+<file path=ppt/slides/slide13.xml><?xml version="1.0" encoding="utf-8"?>
+<p:sld xmlns:a="http://schemas.openxmlformats.org/drawingml/2006/main" xmlns:r="http://schemas.openxmlformats.org/officeDocument/2006/relationships" xmlns:p="http://schemas.openxmlformats.org/presentationml/2006/main">
+  <p:cSld>
+    <p:spTree>
+      <p:nvGrpSpPr>
+        <p:cNvPr id="1" name=""/>
+        <p:cNvGrpSpPr/>
+        <p:nvPr/>
+      </p:nvGrpSpPr>
+      <p:grpSpPr>
+        <a:xfrm>
+          <a:off x="0" y="0"/>
+          <a:ext cx="0" cy="0"/>
+          <a:chOff x="0" y="0"/>
+          <a:chExt cx="0" cy="0"/>
+        </a:xfrm>
+      </p:grpSpPr>
+      <p:sp>
+        <p:nvSpPr>
+          <p:cNvPr id="2" name="Title 1"/>
+          <p:cNvSpPr>
+            <a:spLocks noGrp="1"/>
+          </p:cNvSpPr>
+          <p:nvPr>
+            <p:ph type="title"/>
+          </p:nvPr>
+        </p:nvSpPr>
+        <p:spPr/>
+        <p:txBody>
+          <a:bodyPr/>
+          <a:lstStyle/>
+          <a:p>
+            <a:r>
+              <a:rPr lang="en-AU" dirty="0" smtClean="0"/>
+              <a:t>Lesson 3 – chaining reactive expressions</a:t>
+            </a:r>
+            <a:endParaRPr lang="en-AU" dirty="0"/>
+          </a:p>
+        </p:txBody>
+      </p:sp>
+      <p:grpSp>
+        <p:nvGrpSpPr>
+          <p:cNvPr id="152" name="Group 151"/>
+          <p:cNvGrpSpPr/>
+          <p:nvPr/>
+        </p:nvGrpSpPr>
+        <p:grpSpPr>
+          <a:xfrm>
+            <a:off x="158750" y="2057122"/>
+            <a:ext cx="4591050" cy="3951248"/>
+            <a:chOff x="158750" y="2316202"/>
+            <a:chExt cx="4591050" cy="3951248"/>
+          </a:xfrm>
+        </p:grpSpPr>
+        <p:sp>
+          <p:nvSpPr>
+            <p:cNvPr id="150" name="Rectangle 149"/>
+            <p:cNvSpPr/>
+            <p:nvPr/>
+          </p:nvSpPr>
+          <p:spPr>
+            <a:xfrm>
+              <a:off x="158750" y="2316202"/>
+              <a:ext cx="4591050" cy="3951248"/>
+            </a:xfrm>
+            <a:prstGeom prst="rect">
+              <a:avLst/>
+            </a:prstGeom>
+            <a:solidFill>
+              <a:schemeClr val="accent1">
+                <a:alpha val="5000"/>
+              </a:schemeClr>
+            </a:solidFill>
+            <a:ln>
+              <a:solidFill>
+                <a:schemeClr val="accent1">
+                  <a:shade val="50000"/>
+                  <a:alpha val="99000"/>
+                </a:schemeClr>
+              </a:solidFill>
+            </a:ln>
+          </p:spPr>
+          <p:style>
+            <a:lnRef idx="2">
+              <a:schemeClr val="accent1">
+                <a:shade val="50000"/>
+              </a:schemeClr>
+            </a:lnRef>
+            <a:fillRef idx="1">
+              <a:schemeClr val="accent1"/>
+            </a:fillRef>
+            <a:effectRef idx="0">
+              <a:schemeClr val="accent1"/>
+            </a:effectRef>
+            <a:fontRef idx="minor">
+              <a:schemeClr val="lt1"/>
+            </a:fontRef>
+          </p:style>
+          <p:txBody>
+            <a:bodyPr rtlCol="0" anchor="ctr"/>
+            <a:lstStyle/>
+            <a:p>
+              <a:pPr algn="ctr"/>
+              <a:endParaRPr lang="en-AU"/>
+            </a:p>
+          </p:txBody>
+        </p:sp>
+        <p:sp>
+          <p:nvSpPr>
+            <p:cNvPr id="4" name="Rectangle 3"/>
+            <p:cNvSpPr/>
+            <p:nvPr/>
+          </p:nvSpPr>
+          <p:spPr>
+            <a:xfrm>
+              <a:off x="341906" y="3554233"/>
+              <a:ext cx="1534602" cy="723568"/>
+            </a:xfrm>
+            <a:prstGeom prst="rect">
+              <a:avLst/>
+            </a:prstGeom>
+          </p:spPr>
+          <p:style>
+            <a:lnRef idx="2">
+              <a:schemeClr val="accent1">
+                <a:shade val="50000"/>
+              </a:schemeClr>
+            </a:lnRef>
+            <a:fillRef idx="1">
+              <a:schemeClr val="accent1"/>
+            </a:fillRef>
+            <a:effectRef idx="0">
+              <a:schemeClr val="accent1"/>
+            </a:effectRef>
+            <a:fontRef idx="minor">
+              <a:schemeClr val="lt1"/>
+            </a:fontRef>
+          </p:style>
+          <p:txBody>
+            <a:bodyPr rtlCol="0" anchor="ctr"/>
+            <a:lstStyle/>
+            <a:p>
+              <a:pPr algn="ctr"/>
+              <a:endParaRPr lang="en-AU"/>
+            </a:p>
+          </p:txBody>
+        </p:sp>
+        <p:sp>
+          <p:nvSpPr>
+            <p:cNvPr id="5" name="Rectangle 4"/>
+            <p:cNvSpPr/>
+            <p:nvPr/>
+          </p:nvSpPr>
+          <p:spPr>
+            <a:xfrm>
+              <a:off x="341906" y="5306169"/>
+              <a:ext cx="1534602" cy="723568"/>
+            </a:xfrm>
+            <a:prstGeom prst="rect">
+              <a:avLst/>
+            </a:prstGeom>
+          </p:spPr>
+          <p:style>
+            <a:lnRef idx="2">
+              <a:schemeClr val="accent1">
+                <a:shade val="50000"/>
+              </a:schemeClr>
+            </a:lnRef>
+            <a:fillRef idx="1">
+              <a:schemeClr val="accent1"/>
+            </a:fillRef>
+            <a:effectRef idx="0">
+              <a:schemeClr val="accent1"/>
+            </a:effectRef>
+            <a:fontRef idx="minor">
+              <a:schemeClr val="lt1"/>
+            </a:fontRef>
+          </p:style>
+          <p:txBody>
+            <a:bodyPr rtlCol="0" anchor="ctr"/>
+            <a:lstStyle/>
+            <a:p>
+              <a:pPr algn="ctr"/>
+              <a:endParaRPr lang="en-AU"/>
+            </a:p>
+          </p:txBody>
+        </p:sp>
+        <p:sp>
+          <p:nvSpPr>
+            <p:cNvPr id="6" name="Rectangle 5"/>
+            <p:cNvSpPr/>
+            <p:nvPr/>
+          </p:nvSpPr>
+          <p:spPr>
+            <a:xfrm>
+              <a:off x="341906" y="4430201"/>
+              <a:ext cx="1534602" cy="723568"/>
+            </a:xfrm>
+            <a:prstGeom prst="rect">
+              <a:avLst/>
+            </a:prstGeom>
+          </p:spPr>
+          <p:style>
+            <a:lnRef idx="2">
+              <a:schemeClr val="accent1">
+                <a:shade val="50000"/>
+              </a:schemeClr>
+            </a:lnRef>
+            <a:fillRef idx="1">
+              <a:schemeClr val="accent1"/>
+            </a:fillRef>
+            <a:effectRef idx="0">
+              <a:schemeClr val="accent1"/>
+            </a:effectRef>
+            <a:fontRef idx="minor">
+              <a:schemeClr val="lt1"/>
+            </a:fontRef>
+          </p:style>
+          <p:txBody>
+            <a:bodyPr rtlCol="0" anchor="ctr"/>
+            <a:lstStyle/>
+            <a:p>
+              <a:pPr algn="ctr"/>
+              <a:endParaRPr lang="en-AU"/>
+            </a:p>
+          </p:txBody>
+        </p:sp>
+        <p:sp>
+          <p:nvSpPr>
+            <p:cNvPr id="7" name="TextBox 6"/>
+            <p:cNvSpPr txBox="1"/>
+            <p:nvPr/>
+          </p:nvSpPr>
+          <p:spPr>
+            <a:xfrm>
+              <a:off x="723569" y="3721213"/>
+              <a:ext cx="1288111" cy="338554"/>
+            </a:xfrm>
+            <a:prstGeom prst="rect">
+              <a:avLst/>
+            </a:prstGeom>
+            <a:noFill/>
+          </p:spPr>
+          <p:txBody>
+            <a:bodyPr wrap="square" rtlCol="0">
+              <a:spAutoFit/>
+            </a:bodyPr>
+            <a:lstStyle/>
+            <a:p>
+              <a:r>
+                <a:rPr lang="en-AU" sz="1600" dirty="0" smtClean="0">
+                  <a:latin typeface="Consolas" panose="020B0609020204030204" pitchFamily="49" charset="0"/>
+                </a:rPr>
+                <a:t>x axis</a:t>
+              </a:r>
+              <a:endParaRPr lang="en-AU" sz="1600" dirty="0">
+                <a:latin typeface="Consolas" panose="020B0609020204030204" pitchFamily="49" charset="0"/>
+              </a:endParaRPr>
+            </a:p>
+          </p:txBody>
+        </p:sp>
+        <p:sp>
+          <p:nvSpPr>
+            <p:cNvPr id="8" name="TextBox 7"/>
+            <p:cNvSpPr txBox="1"/>
+            <p:nvPr/>
+          </p:nvSpPr>
+          <p:spPr>
+            <a:xfrm>
+              <a:off x="723570" y="5459434"/>
+              <a:ext cx="1184746" cy="338554"/>
+            </a:xfrm>
+            <a:prstGeom prst="rect">
+              <a:avLst/>
+            </a:prstGeom>
+            <a:noFill/>
+          </p:spPr>
+          <p:txBody>
+            <a:bodyPr wrap="square" rtlCol="0">
+              <a:spAutoFit/>
+            </a:bodyPr>
+            <a:lstStyle/>
+            <a:p>
+              <a:r>
+                <a:rPr lang="en-AU" sz="1600" dirty="0" smtClean="0">
+                  <a:latin typeface="Consolas" panose="020B0609020204030204" pitchFamily="49" charset="0"/>
+                </a:rPr>
+                <a:t>factor</a:t>
+              </a:r>
+              <a:endParaRPr lang="en-AU" sz="1600" dirty="0">
+                <a:latin typeface="Consolas" panose="020B0609020204030204" pitchFamily="49" charset="0"/>
+              </a:endParaRPr>
+            </a:p>
+          </p:txBody>
+        </p:sp>
+        <p:sp>
+          <p:nvSpPr>
+            <p:cNvPr id="9" name="TextBox 8"/>
+            <p:cNvSpPr txBox="1"/>
+            <p:nvPr/>
+          </p:nvSpPr>
+          <p:spPr>
+            <a:xfrm>
+              <a:off x="723569" y="4588967"/>
+              <a:ext cx="1049575" cy="338554"/>
+            </a:xfrm>
+            <a:prstGeom prst="rect">
+              <a:avLst/>
+            </a:prstGeom>
+            <a:noFill/>
+          </p:spPr>
+          <p:txBody>
+            <a:bodyPr wrap="square" rtlCol="0">
+              <a:spAutoFit/>
+            </a:bodyPr>
+            <a:lstStyle/>
+            <a:p>
+              <a:r>
+                <a:rPr lang="en-AU" sz="1600" dirty="0" smtClean="0">
+                  <a:latin typeface="Consolas" panose="020B0609020204030204" pitchFamily="49" charset="0"/>
+                </a:rPr>
+                <a:t>y axis</a:t>
+              </a:r>
+              <a:endParaRPr lang="en-AU" sz="1600" dirty="0">
+                <a:latin typeface="Consolas" panose="020B0609020204030204" pitchFamily="49" charset="0"/>
+              </a:endParaRPr>
+            </a:p>
+          </p:txBody>
+        </p:sp>
+        <p:sp>
+          <p:nvSpPr>
+            <p:cNvPr id="10" name="TextBox 9"/>
+            <p:cNvSpPr txBox="1"/>
+            <p:nvPr/>
+          </p:nvSpPr>
+          <p:spPr>
+            <a:xfrm>
+              <a:off x="723569" y="3119406"/>
+              <a:ext cx="818983" cy="369332"/>
+            </a:xfrm>
+            <a:prstGeom prst="rect">
+              <a:avLst/>
+            </a:prstGeom>
+            <a:noFill/>
+          </p:spPr>
+          <p:txBody>
+            <a:bodyPr wrap="square" rtlCol="0">
+              <a:spAutoFit/>
+            </a:bodyPr>
+            <a:lstStyle/>
+            <a:p>
+              <a:r>
+                <a:rPr lang="en-AU" dirty="0" smtClean="0"/>
+                <a:t>Input</a:t>
+              </a:r>
+              <a:endParaRPr lang="en-AU" dirty="0"/>
+            </a:p>
+          </p:txBody>
+        </p:sp>
+        <p:sp>
+          <p:nvSpPr>
+            <p:cNvPr id="13" name="Rectangle 12"/>
+            <p:cNvSpPr/>
+            <p:nvPr/>
+          </p:nvSpPr>
+          <p:spPr>
+            <a:xfrm>
+              <a:off x="2997645" y="3804469"/>
+              <a:ext cx="1534602" cy="723568"/>
+            </a:xfrm>
+            <a:prstGeom prst="rect">
+              <a:avLst/>
+            </a:prstGeom>
+            <a:solidFill>
+              <a:srgbClr val="FFC000"/>
+            </a:solidFill>
+          </p:spPr>
+          <p:style>
+            <a:lnRef idx="2">
+              <a:schemeClr val="accent1">
+                <a:shade val="50000"/>
+              </a:schemeClr>
+            </a:lnRef>
+            <a:fillRef idx="1">
+              <a:schemeClr val="accent1"/>
+            </a:fillRef>
+            <a:effectRef idx="0">
+              <a:schemeClr val="accent1"/>
+            </a:effectRef>
+            <a:fontRef idx="minor">
+              <a:schemeClr val="lt1"/>
+            </a:fontRef>
+          </p:style>
+          <p:txBody>
+            <a:bodyPr rtlCol="0" anchor="ctr"/>
+            <a:lstStyle/>
+            <a:p>
+              <a:pPr algn="ctr"/>
+              <a:endParaRPr lang="en-AU"/>
+            </a:p>
+          </p:txBody>
+        </p:sp>
+        <p:sp>
+          <p:nvSpPr>
+            <p:cNvPr id="15" name="TextBox 14"/>
+            <p:cNvSpPr txBox="1"/>
+            <p:nvPr/>
+          </p:nvSpPr>
+          <p:spPr>
+            <a:xfrm>
+              <a:off x="3140108" y="3981587"/>
+              <a:ext cx="1392140" cy="338554"/>
+            </a:xfrm>
+            <a:prstGeom prst="rect">
+              <a:avLst/>
+            </a:prstGeom>
+            <a:noFill/>
+          </p:spPr>
+          <p:txBody>
+            <a:bodyPr wrap="square" rtlCol="0">
+              <a:spAutoFit/>
+            </a:bodyPr>
+            <a:lstStyle/>
+            <a:p>
+              <a:r>
+                <a:rPr lang="en-AU" sz="1600" dirty="0" smtClean="0">
+                  <a:latin typeface="Consolas" panose="020B0609020204030204" pitchFamily="49" charset="0"/>
+                </a:rPr>
+                <a:t>data table</a:t>
+              </a:r>
+              <a:endParaRPr lang="en-AU" sz="1600" dirty="0">
+                <a:latin typeface="Consolas" panose="020B0609020204030204" pitchFamily="49" charset="0"/>
+              </a:endParaRPr>
+            </a:p>
+          </p:txBody>
+        </p:sp>
+        <p:sp>
+          <p:nvSpPr>
+            <p:cNvPr id="14" name="Rectangle 13"/>
+            <p:cNvSpPr/>
+            <p:nvPr/>
+          </p:nvSpPr>
+          <p:spPr>
+            <a:xfrm>
+              <a:off x="2997645" y="4948576"/>
+              <a:ext cx="1534602" cy="723568"/>
+            </a:xfrm>
+            <a:prstGeom prst="rect">
+              <a:avLst/>
+            </a:prstGeom>
+            <a:solidFill>
+              <a:srgbClr val="FFC000"/>
+            </a:solidFill>
+          </p:spPr>
+          <p:style>
+            <a:lnRef idx="2">
+              <a:schemeClr val="accent1">
+                <a:shade val="50000"/>
+              </a:schemeClr>
+            </a:lnRef>
+            <a:fillRef idx="1">
+              <a:schemeClr val="accent1"/>
+            </a:fillRef>
+            <a:effectRef idx="0">
+              <a:schemeClr val="accent1"/>
+            </a:effectRef>
+            <a:fontRef idx="minor">
+              <a:schemeClr val="lt1"/>
+            </a:fontRef>
+          </p:style>
+          <p:txBody>
+            <a:bodyPr rtlCol="0" anchor="ctr"/>
+            <a:lstStyle/>
+            <a:p>
+              <a:pPr algn="ctr"/>
+              <a:endParaRPr lang="en-AU"/>
+            </a:p>
+          </p:txBody>
+        </p:sp>
+        <p:sp>
+          <p:nvSpPr>
+            <p:cNvPr id="16" name="TextBox 15"/>
+            <p:cNvSpPr txBox="1"/>
+            <p:nvPr/>
+          </p:nvSpPr>
+          <p:spPr>
+            <a:xfrm>
+              <a:off x="3360753" y="5110714"/>
+              <a:ext cx="1041621" cy="338554"/>
+            </a:xfrm>
+            <a:prstGeom prst="rect">
+              <a:avLst/>
+            </a:prstGeom>
+            <a:noFill/>
+          </p:spPr>
+          <p:txBody>
+            <a:bodyPr wrap="square" rtlCol="0">
+              <a:spAutoFit/>
+            </a:bodyPr>
+            <a:lstStyle/>
+            <a:p>
+              <a:r>
+                <a:rPr lang="en-AU" sz="1600" dirty="0" smtClean="0">
+                  <a:latin typeface="Consolas" panose="020B0609020204030204" pitchFamily="49" charset="0"/>
+                </a:rPr>
+                <a:t>graph</a:t>
+              </a:r>
+              <a:endParaRPr lang="en-AU" sz="1600" dirty="0">
+                <a:latin typeface="Consolas" panose="020B0609020204030204" pitchFamily="49" charset="0"/>
+              </a:endParaRPr>
+            </a:p>
+          </p:txBody>
+        </p:sp>
+        <p:sp>
+          <p:nvSpPr>
+            <p:cNvPr id="73" name="TextBox 72"/>
+            <p:cNvSpPr txBox="1"/>
+            <p:nvPr/>
+          </p:nvSpPr>
+          <p:spPr>
+            <a:xfrm>
+              <a:off x="522466" y="2322505"/>
+              <a:ext cx="3797410" cy="461665"/>
+            </a:xfrm>
+            <a:prstGeom prst="rect">
+              <a:avLst/>
+            </a:prstGeom>
+            <a:noFill/>
+          </p:spPr>
+          <p:txBody>
+            <a:bodyPr wrap="square" rtlCol="0">
+              <a:spAutoFit/>
+            </a:bodyPr>
+            <a:lstStyle/>
+            <a:p>
+              <a:r>
+                <a:rPr lang="en-AU" sz="2400" dirty="0" smtClean="0"/>
+                <a:t>Basic data explorer structure</a:t>
+              </a:r>
+              <a:endParaRPr lang="en-AU" sz="2400" dirty="0"/>
+            </a:p>
+          </p:txBody>
+        </p:sp>
+        <p:cxnSp>
+          <p:nvCxnSpPr>
+            <p:cNvPr id="86" name="Straight Arrow Connector 85"/>
+            <p:cNvCxnSpPr/>
+            <p:nvPr/>
+          </p:nvCxnSpPr>
+          <p:spPr>
+            <a:xfrm flipH="1" flipV="1">
+              <a:off x="1908315" y="3804469"/>
+              <a:ext cx="1025717" cy="255298"/>
+            </a:xfrm>
+            <a:prstGeom prst="straightConnector1">
+              <a:avLst/>
+            </a:prstGeom>
+            <a:ln>
+              <a:solidFill>
+                <a:schemeClr val="tx1"/>
+              </a:solidFill>
+              <a:tailEnd type="triangle"/>
+            </a:ln>
+          </p:spPr>
+          <p:style>
+            <a:lnRef idx="1">
+              <a:schemeClr val="accent1"/>
+            </a:lnRef>
+            <a:fillRef idx="0">
+              <a:schemeClr val="accent1"/>
+            </a:fillRef>
+            <a:effectRef idx="0">
+              <a:schemeClr val="accent1"/>
+            </a:effectRef>
+            <a:fontRef idx="minor">
+              <a:schemeClr val="tx1"/>
+            </a:fontRef>
+          </p:style>
+        </p:cxnSp>
+        <p:cxnSp>
+          <p:nvCxnSpPr>
+            <p:cNvPr id="88" name="Straight Arrow Connector 87"/>
+            <p:cNvCxnSpPr/>
+            <p:nvPr/>
+          </p:nvCxnSpPr>
+          <p:spPr>
+            <a:xfrm flipH="1">
+              <a:off x="1908315" y="4171598"/>
+              <a:ext cx="1018099" cy="594077"/>
+            </a:xfrm>
+            <a:prstGeom prst="straightConnector1">
+              <a:avLst/>
+            </a:prstGeom>
+            <a:ln>
+              <a:solidFill>
+                <a:schemeClr val="tx1"/>
+              </a:solidFill>
+              <a:tailEnd type="triangle"/>
+            </a:ln>
+          </p:spPr>
+          <p:style>
+            <a:lnRef idx="1">
+              <a:schemeClr val="accent1"/>
+            </a:lnRef>
+            <a:fillRef idx="0">
+              <a:schemeClr val="accent1"/>
+            </a:fillRef>
+            <a:effectRef idx="0">
+              <a:schemeClr val="accent1"/>
+            </a:effectRef>
+            <a:fontRef idx="minor">
+              <a:schemeClr val="tx1"/>
+            </a:fontRef>
+          </p:style>
+        </p:cxnSp>
+        <p:cxnSp>
+          <p:nvCxnSpPr>
+            <p:cNvPr id="90" name="Straight Arrow Connector 89"/>
+            <p:cNvCxnSpPr/>
+            <p:nvPr/>
+          </p:nvCxnSpPr>
+          <p:spPr>
+            <a:xfrm flipH="1">
+              <a:off x="1908316" y="4294888"/>
+              <a:ext cx="1009980" cy="1333823"/>
+            </a:xfrm>
+            <a:prstGeom prst="straightConnector1">
+              <a:avLst/>
+            </a:prstGeom>
+            <a:ln>
+              <a:solidFill>
+                <a:schemeClr val="tx1"/>
+              </a:solidFill>
+              <a:tailEnd type="triangle"/>
+            </a:ln>
+          </p:spPr>
+          <p:style>
+            <a:lnRef idx="1">
+              <a:schemeClr val="accent1"/>
+            </a:lnRef>
+            <a:fillRef idx="0">
+              <a:schemeClr val="accent1"/>
+            </a:fillRef>
+            <a:effectRef idx="0">
+              <a:schemeClr val="accent1"/>
+            </a:effectRef>
+            <a:fontRef idx="minor">
+              <a:schemeClr val="tx1"/>
+            </a:fontRef>
+          </p:style>
+        </p:cxnSp>
+        <p:cxnSp>
+          <p:nvCxnSpPr>
+            <p:cNvPr id="99" name="Straight Arrow Connector 98"/>
+            <p:cNvCxnSpPr/>
+            <p:nvPr/>
+          </p:nvCxnSpPr>
+          <p:spPr>
+            <a:xfrm flipH="1" flipV="1">
+              <a:off x="1908315" y="3981587"/>
+              <a:ext cx="1025717" cy="1176218"/>
+            </a:xfrm>
+            <a:prstGeom prst="straightConnector1">
+              <a:avLst/>
+            </a:prstGeom>
+            <a:ln>
+              <a:solidFill>
+                <a:schemeClr val="tx1"/>
+              </a:solidFill>
+              <a:tailEnd type="triangle"/>
+            </a:ln>
+          </p:spPr>
+          <p:style>
+            <a:lnRef idx="1">
+              <a:schemeClr val="accent1"/>
+            </a:lnRef>
+            <a:fillRef idx="0">
+              <a:schemeClr val="accent1"/>
+            </a:fillRef>
+            <a:effectRef idx="0">
+              <a:schemeClr val="accent1"/>
+            </a:effectRef>
+            <a:fontRef idx="minor">
+              <a:schemeClr val="tx1"/>
+            </a:fontRef>
+          </p:style>
+        </p:cxnSp>
+        <p:cxnSp>
+          <p:nvCxnSpPr>
+            <p:cNvPr id="101" name="Straight Arrow Connector 100"/>
+            <p:cNvCxnSpPr/>
+            <p:nvPr/>
+          </p:nvCxnSpPr>
+          <p:spPr>
+            <a:xfrm flipH="1" flipV="1">
+              <a:off x="1915607" y="4814911"/>
+              <a:ext cx="1002691" cy="456166"/>
+            </a:xfrm>
+            <a:prstGeom prst="straightConnector1">
+              <a:avLst/>
+            </a:prstGeom>
+            <a:ln>
+              <a:solidFill>
+                <a:schemeClr val="tx1"/>
+              </a:solidFill>
+              <a:tailEnd type="triangle"/>
+            </a:ln>
+          </p:spPr>
+          <p:style>
+            <a:lnRef idx="1">
+              <a:schemeClr val="accent1"/>
+            </a:lnRef>
+            <a:fillRef idx="0">
+              <a:schemeClr val="accent1"/>
+            </a:fillRef>
+            <a:effectRef idx="0">
+              <a:schemeClr val="accent1"/>
+            </a:effectRef>
+            <a:fontRef idx="minor">
+              <a:schemeClr val="tx1"/>
+            </a:fontRef>
+          </p:style>
+        </p:cxnSp>
+        <p:cxnSp>
+          <p:nvCxnSpPr>
+            <p:cNvPr id="103" name="Straight Arrow Connector 102"/>
+            <p:cNvCxnSpPr/>
+            <p:nvPr/>
+          </p:nvCxnSpPr>
+          <p:spPr>
+            <a:xfrm flipH="1">
+              <a:off x="1915607" y="5384292"/>
+              <a:ext cx="1019893" cy="367709"/>
+            </a:xfrm>
+            <a:prstGeom prst="straightConnector1">
+              <a:avLst/>
+            </a:prstGeom>
+            <a:ln>
+              <a:solidFill>
+                <a:schemeClr val="tx1"/>
+              </a:solidFill>
+              <a:tailEnd type="triangle"/>
+            </a:ln>
+          </p:spPr>
+          <p:style>
+            <a:lnRef idx="1">
+              <a:schemeClr val="accent1"/>
+            </a:lnRef>
+            <a:fillRef idx="0">
+              <a:schemeClr val="accent1"/>
+            </a:fillRef>
+            <a:effectRef idx="0">
+              <a:schemeClr val="accent1"/>
+            </a:effectRef>
+            <a:fontRef idx="minor">
+              <a:schemeClr val="tx1"/>
+            </a:fontRef>
+          </p:style>
+        </p:cxnSp>
+        <p:sp>
+          <p:nvSpPr>
+            <p:cNvPr id="105" name="TextBox 104"/>
+            <p:cNvSpPr txBox="1"/>
+            <p:nvPr/>
+          </p:nvSpPr>
+          <p:spPr>
+            <a:xfrm>
+              <a:off x="2038349" y="3554233"/>
+              <a:ext cx="934837" cy="276999"/>
+            </a:xfrm>
+            <a:prstGeom prst="rect">
+              <a:avLst/>
+            </a:prstGeom>
+            <a:noFill/>
+          </p:spPr>
+          <p:txBody>
+            <a:bodyPr wrap="square" rtlCol="0">
+              <a:spAutoFit/>
+            </a:bodyPr>
+            <a:lstStyle/>
+            <a:p>
+              <a:r>
+                <a:rPr lang="en-AU" sz="1200" i="1" dirty="0" smtClean="0"/>
+                <a:t>dependency</a:t>
+              </a:r>
+              <a:endParaRPr lang="en-AU" i="1" dirty="0"/>
+            </a:p>
+          </p:txBody>
+        </p:sp>
+        <p:sp>
+          <p:nvSpPr>
+            <p:cNvPr id="118" name="TextBox 117"/>
+            <p:cNvSpPr txBox="1"/>
+            <p:nvPr/>
+          </p:nvSpPr>
+          <p:spPr>
+            <a:xfrm>
+              <a:off x="3292507" y="3158168"/>
+              <a:ext cx="1058848" cy="369332"/>
+            </a:xfrm>
+            <a:prstGeom prst="rect">
+              <a:avLst/>
+            </a:prstGeom>
+            <a:noFill/>
+          </p:spPr>
+          <p:txBody>
+            <a:bodyPr wrap="square" rtlCol="0">
+              <a:spAutoFit/>
+            </a:bodyPr>
+            <a:lstStyle/>
+            <a:p>
+              <a:r>
+                <a:rPr lang="en-AU" dirty="0" smtClean="0"/>
+                <a:t>Output</a:t>
+              </a:r>
+              <a:endParaRPr lang="en-AU" dirty="0"/>
+            </a:p>
+          </p:txBody>
+        </p:sp>
+      </p:grpSp>
+      <p:grpSp>
+        <p:nvGrpSpPr>
+          <p:cNvPr id="167" name="Group 166"/>
+          <p:cNvGrpSpPr/>
+          <p:nvPr/>
+        </p:nvGrpSpPr>
+        <p:grpSpPr>
+          <a:xfrm>
+            <a:off x="5356861" y="2057122"/>
+            <a:ext cx="6591300" cy="3951248"/>
+            <a:chOff x="5356861" y="2057122"/>
+            <a:chExt cx="6591300" cy="3951248"/>
+          </a:xfrm>
+        </p:grpSpPr>
+        <p:sp>
+          <p:nvSpPr>
+            <p:cNvPr id="17" name="TextBox 16"/>
+            <p:cNvSpPr txBox="1"/>
+            <p:nvPr/>
+          </p:nvSpPr>
+          <p:spPr>
+            <a:xfrm>
+              <a:off x="10069201" y="2889194"/>
+              <a:ext cx="1058848" cy="369332"/>
+            </a:xfrm>
+            <a:prstGeom prst="rect">
+              <a:avLst/>
+            </a:prstGeom>
+            <a:noFill/>
+          </p:spPr>
+          <p:txBody>
+            <a:bodyPr wrap="square" rtlCol="0">
+              <a:spAutoFit/>
+            </a:bodyPr>
+            <a:lstStyle/>
+            <a:p>
+              <a:r>
+                <a:rPr lang="en-AU" dirty="0" smtClean="0"/>
+                <a:t>Output</a:t>
+              </a:r>
+              <a:endParaRPr lang="en-AU" dirty="0"/>
+            </a:p>
+          </p:txBody>
+        </p:sp>
+        <p:sp>
+          <p:nvSpPr>
+            <p:cNvPr id="80" name="TextBox 79"/>
+            <p:cNvSpPr txBox="1"/>
+            <p:nvPr/>
+          </p:nvSpPr>
+          <p:spPr>
+            <a:xfrm>
+              <a:off x="5852160" y="2891701"/>
+              <a:ext cx="1030732" cy="369332"/>
+            </a:xfrm>
+            <a:prstGeom prst="rect">
+              <a:avLst/>
+            </a:prstGeom>
+            <a:noFill/>
+          </p:spPr>
+          <p:txBody>
+            <a:bodyPr wrap="square" rtlCol="0">
+              <a:spAutoFit/>
+            </a:bodyPr>
+            <a:lstStyle/>
+            <a:p>
+              <a:r>
+                <a:rPr lang="en-AU" dirty="0" smtClean="0"/>
+                <a:t>Input 1 </a:t>
+              </a:r>
+              <a:endParaRPr lang="en-AU" dirty="0"/>
+            </a:p>
+          </p:txBody>
+        </p:sp>
+        <p:sp>
+          <p:nvSpPr>
+            <p:cNvPr id="82" name="Rectangle 81"/>
+            <p:cNvSpPr/>
+            <p:nvPr/>
+          </p:nvSpPr>
+          <p:spPr>
+            <a:xfrm>
+              <a:off x="5524239" y="4163414"/>
+              <a:ext cx="1534602" cy="723568"/>
+            </a:xfrm>
+            <a:prstGeom prst="rect">
+              <a:avLst/>
+            </a:prstGeom>
+          </p:spPr>
+          <p:style>
+            <a:lnRef idx="2">
+              <a:schemeClr val="accent1">
+                <a:shade val="50000"/>
+              </a:schemeClr>
+            </a:lnRef>
+            <a:fillRef idx="1">
+              <a:schemeClr val="accent1"/>
+            </a:fillRef>
+            <a:effectRef idx="0">
+              <a:schemeClr val="accent1"/>
+            </a:effectRef>
+            <a:fontRef idx="minor">
+              <a:schemeClr val="lt1"/>
+            </a:fontRef>
+          </p:style>
+          <p:txBody>
+            <a:bodyPr rtlCol="0" anchor="ctr"/>
+            <a:lstStyle/>
+            <a:p>
+              <a:pPr algn="ctr"/>
+              <a:endParaRPr lang="en-AU"/>
+            </a:p>
+          </p:txBody>
+        </p:sp>
+        <p:sp>
+          <p:nvSpPr>
+            <p:cNvPr id="83" name="TextBox 82"/>
+            <p:cNvSpPr txBox="1"/>
+            <p:nvPr/>
+          </p:nvSpPr>
+          <p:spPr>
+            <a:xfrm>
+              <a:off x="5524240" y="4313567"/>
+              <a:ext cx="1575696" cy="338554"/>
+            </a:xfrm>
+            <a:prstGeom prst="rect">
+              <a:avLst/>
+            </a:prstGeom>
+            <a:noFill/>
+          </p:spPr>
+          <p:txBody>
+            <a:bodyPr wrap="square" rtlCol="0">
+              <a:spAutoFit/>
+            </a:bodyPr>
+            <a:lstStyle/>
+            <a:p>
+              <a:r>
+                <a:rPr lang="en-AU" sz="1600" dirty="0" err="1" smtClean="0">
+                  <a:latin typeface="Consolas" panose="020B0609020204030204" pitchFamily="49" charset="0"/>
+                </a:rPr>
+                <a:t>uploadedFile</a:t>
+              </a:r>
+              <a:endParaRPr lang="en-AU" sz="1600" dirty="0">
+                <a:latin typeface="Consolas" panose="020B0609020204030204" pitchFamily="49" charset="0"/>
+              </a:endParaRPr>
+            </a:p>
+          </p:txBody>
+        </p:sp>
+        <p:sp>
+          <p:nvSpPr>
+            <p:cNvPr id="74" name="Rectangle 73"/>
+            <p:cNvSpPr/>
+            <p:nvPr/>
+          </p:nvSpPr>
+          <p:spPr>
+            <a:xfrm>
+              <a:off x="7745367" y="3317404"/>
+              <a:ext cx="1534602" cy="723568"/>
+            </a:xfrm>
+            <a:prstGeom prst="rect">
+              <a:avLst/>
+            </a:prstGeom>
+            <a:solidFill>
+              <a:srgbClr val="00B050"/>
+            </a:solidFill>
+          </p:spPr>
+          <p:style>
+            <a:lnRef idx="2">
+              <a:schemeClr val="accent1">
+                <a:shade val="50000"/>
+              </a:schemeClr>
+            </a:lnRef>
+            <a:fillRef idx="1">
+              <a:schemeClr val="accent1"/>
+            </a:fillRef>
+            <a:effectRef idx="0">
+              <a:schemeClr val="accent1"/>
+            </a:effectRef>
+            <a:fontRef idx="minor">
+              <a:schemeClr val="lt1"/>
+            </a:fontRef>
+          </p:style>
+          <p:txBody>
+            <a:bodyPr rtlCol="0" anchor="ctr"/>
+            <a:lstStyle/>
+            <a:p>
+              <a:pPr algn="ctr"/>
+              <a:endParaRPr lang="en-AU"/>
+            </a:p>
+          </p:txBody>
+        </p:sp>
+        <p:sp>
+          <p:nvSpPr>
+            <p:cNvPr id="75" name="Rectangle 74"/>
+            <p:cNvSpPr/>
+            <p:nvPr/>
+          </p:nvSpPr>
+          <p:spPr>
+            <a:xfrm>
+              <a:off x="7745367" y="5069340"/>
+              <a:ext cx="1534602" cy="723568"/>
+            </a:xfrm>
+            <a:prstGeom prst="rect">
+              <a:avLst/>
+            </a:prstGeom>
+            <a:solidFill>
+              <a:srgbClr val="00B050"/>
+            </a:solidFill>
+          </p:spPr>
+          <p:style>
+            <a:lnRef idx="2">
+              <a:schemeClr val="accent1">
+                <a:shade val="50000"/>
+              </a:schemeClr>
+            </a:lnRef>
+            <a:fillRef idx="1">
+              <a:schemeClr val="accent1"/>
+            </a:fillRef>
+            <a:effectRef idx="0">
+              <a:schemeClr val="accent1"/>
+            </a:effectRef>
+            <a:fontRef idx="minor">
+              <a:schemeClr val="lt1"/>
+            </a:fontRef>
+          </p:style>
+          <p:txBody>
+            <a:bodyPr rtlCol="0" anchor="ctr"/>
+            <a:lstStyle/>
+            <a:p>
+              <a:pPr algn="ctr"/>
+              <a:endParaRPr lang="en-AU"/>
+            </a:p>
+          </p:txBody>
+        </p:sp>
+        <p:sp>
+          <p:nvSpPr>
+            <p:cNvPr id="76" name="Rectangle 75"/>
+            <p:cNvSpPr/>
+            <p:nvPr/>
+          </p:nvSpPr>
+          <p:spPr>
+            <a:xfrm>
+              <a:off x="7745367" y="4193372"/>
+              <a:ext cx="1534602" cy="723568"/>
+            </a:xfrm>
+            <a:prstGeom prst="rect">
+              <a:avLst/>
+            </a:prstGeom>
+            <a:solidFill>
+              <a:srgbClr val="00B050"/>
+            </a:solidFill>
+          </p:spPr>
+          <p:style>
+            <a:lnRef idx="2">
+              <a:schemeClr val="accent1">
+                <a:shade val="50000"/>
+              </a:schemeClr>
+            </a:lnRef>
+            <a:fillRef idx="1">
+              <a:schemeClr val="accent1"/>
+            </a:fillRef>
+            <a:effectRef idx="0">
+              <a:schemeClr val="accent1"/>
+            </a:effectRef>
+            <a:fontRef idx="minor">
+              <a:schemeClr val="lt1"/>
+            </a:fontRef>
+          </p:style>
+          <p:txBody>
+            <a:bodyPr rtlCol="0" anchor="ctr"/>
+            <a:lstStyle/>
+            <a:p>
+              <a:pPr algn="ctr"/>
+              <a:endParaRPr lang="en-AU"/>
+            </a:p>
+          </p:txBody>
+        </p:sp>
+        <p:sp>
+          <p:nvSpPr>
+            <p:cNvPr id="77" name="TextBox 76"/>
+            <p:cNvSpPr txBox="1"/>
+            <p:nvPr/>
+          </p:nvSpPr>
+          <p:spPr>
+            <a:xfrm>
+              <a:off x="8127030" y="3484384"/>
+              <a:ext cx="1288111" cy="338554"/>
+            </a:xfrm>
+            <a:prstGeom prst="rect">
+              <a:avLst/>
+            </a:prstGeom>
+            <a:noFill/>
+          </p:spPr>
+          <p:txBody>
+            <a:bodyPr wrap="square" rtlCol="0">
+              <a:spAutoFit/>
+            </a:bodyPr>
+            <a:lstStyle/>
+            <a:p>
+              <a:r>
+                <a:rPr lang="en-AU" sz="1600" dirty="0" smtClean="0">
+                  <a:latin typeface="Consolas" panose="020B0609020204030204" pitchFamily="49" charset="0"/>
+                </a:rPr>
+                <a:t>x axis</a:t>
+              </a:r>
+              <a:endParaRPr lang="en-AU" sz="1600" dirty="0">
+                <a:latin typeface="Consolas" panose="020B0609020204030204" pitchFamily="49" charset="0"/>
+              </a:endParaRPr>
+            </a:p>
+          </p:txBody>
+        </p:sp>
+        <p:sp>
+          <p:nvSpPr>
+            <p:cNvPr id="78" name="TextBox 77"/>
+            <p:cNvSpPr txBox="1"/>
+            <p:nvPr/>
+          </p:nvSpPr>
+          <p:spPr>
+            <a:xfrm>
+              <a:off x="8127031" y="5222605"/>
+              <a:ext cx="1085074" cy="338554"/>
+            </a:xfrm>
+            <a:prstGeom prst="rect">
+              <a:avLst/>
+            </a:prstGeom>
+            <a:noFill/>
+          </p:spPr>
+          <p:txBody>
+            <a:bodyPr wrap="square" rtlCol="0">
+              <a:spAutoFit/>
+            </a:bodyPr>
+            <a:lstStyle/>
+            <a:p>
+              <a:r>
+                <a:rPr lang="en-AU" sz="1600" dirty="0" smtClean="0">
+                  <a:latin typeface="Consolas" panose="020B0609020204030204" pitchFamily="49" charset="0"/>
+                </a:rPr>
+                <a:t>factor</a:t>
+              </a:r>
+              <a:endParaRPr lang="en-AU" sz="1600" dirty="0">
+                <a:latin typeface="Consolas" panose="020B0609020204030204" pitchFamily="49" charset="0"/>
+              </a:endParaRPr>
+            </a:p>
+          </p:txBody>
+        </p:sp>
+        <p:sp>
+          <p:nvSpPr>
+            <p:cNvPr id="79" name="TextBox 78"/>
+            <p:cNvSpPr txBox="1"/>
+            <p:nvPr/>
+          </p:nvSpPr>
+          <p:spPr>
+            <a:xfrm>
+              <a:off x="8127030" y="4352138"/>
+              <a:ext cx="1288111" cy="338554"/>
+            </a:xfrm>
+            <a:prstGeom prst="rect">
+              <a:avLst/>
+            </a:prstGeom>
+            <a:noFill/>
+          </p:spPr>
+          <p:txBody>
+            <a:bodyPr wrap="square" rtlCol="0">
+              <a:spAutoFit/>
+            </a:bodyPr>
+            <a:lstStyle/>
+            <a:p>
+              <a:r>
+                <a:rPr lang="en-AU" sz="1600" dirty="0" smtClean="0">
+                  <a:latin typeface="Consolas" panose="020B0609020204030204" pitchFamily="49" charset="0"/>
+                </a:rPr>
+                <a:t>y axis</a:t>
+              </a:r>
+              <a:endParaRPr lang="en-AU" sz="1600" dirty="0">
+                <a:latin typeface="Consolas" panose="020B0609020204030204" pitchFamily="49" charset="0"/>
+              </a:endParaRPr>
+            </a:p>
+          </p:txBody>
+        </p:sp>
+        <p:sp>
+          <p:nvSpPr>
+            <p:cNvPr id="107" name="TextBox 106"/>
+            <p:cNvSpPr txBox="1"/>
+            <p:nvPr/>
+          </p:nvSpPr>
+          <p:spPr>
+            <a:xfrm>
+              <a:off x="7997302" y="2883303"/>
+              <a:ext cx="1030732" cy="369332"/>
+            </a:xfrm>
+            <a:prstGeom prst="rect">
+              <a:avLst/>
+            </a:prstGeom>
+            <a:noFill/>
+          </p:spPr>
+          <p:txBody>
+            <a:bodyPr wrap="square" rtlCol="0">
+              <a:spAutoFit/>
+            </a:bodyPr>
+            <a:lstStyle/>
+            <a:p>
+              <a:r>
+                <a:rPr lang="en-AU" dirty="0" smtClean="0"/>
+                <a:t>Input 2 </a:t>
+              </a:r>
+              <a:endParaRPr lang="en-AU" dirty="0"/>
+            </a:p>
+          </p:txBody>
+        </p:sp>
+        <p:sp>
+          <p:nvSpPr>
+            <p:cNvPr id="109" name="Rectangle 108"/>
+            <p:cNvSpPr/>
+            <p:nvPr/>
+          </p:nvSpPr>
+          <p:spPr>
+            <a:xfrm>
+              <a:off x="10227564" y="3580737"/>
+              <a:ext cx="1534602" cy="723568"/>
+            </a:xfrm>
+            <a:prstGeom prst="rect">
+              <a:avLst/>
+            </a:prstGeom>
+            <a:solidFill>
+              <a:srgbClr val="FFC000"/>
+            </a:solidFill>
+          </p:spPr>
+          <p:style>
+            <a:lnRef idx="2">
+              <a:schemeClr val="accent1">
+                <a:shade val="50000"/>
+              </a:schemeClr>
+            </a:lnRef>
+            <a:fillRef idx="1">
+              <a:schemeClr val="accent1"/>
+            </a:fillRef>
+            <a:effectRef idx="0">
+              <a:schemeClr val="accent1"/>
+            </a:effectRef>
+            <a:fontRef idx="minor">
+              <a:schemeClr val="lt1"/>
+            </a:fontRef>
+          </p:style>
+          <p:txBody>
+            <a:bodyPr rtlCol="0" anchor="ctr"/>
+            <a:lstStyle/>
+            <a:p>
+              <a:pPr algn="ctr"/>
+              <a:endParaRPr lang="en-AU"/>
+            </a:p>
+          </p:txBody>
+        </p:sp>
+        <p:sp>
+          <p:nvSpPr>
+            <p:cNvPr id="110" name="TextBox 109"/>
+            <p:cNvSpPr txBox="1"/>
+            <p:nvPr/>
+          </p:nvSpPr>
+          <p:spPr>
+            <a:xfrm>
+              <a:off x="10339547" y="3757855"/>
+              <a:ext cx="1392140" cy="338554"/>
+            </a:xfrm>
+            <a:prstGeom prst="rect">
+              <a:avLst/>
+            </a:prstGeom>
+            <a:noFill/>
+          </p:spPr>
+          <p:txBody>
+            <a:bodyPr wrap="square" rtlCol="0">
+              <a:spAutoFit/>
+            </a:bodyPr>
+            <a:lstStyle/>
+            <a:p>
+              <a:r>
+                <a:rPr lang="en-AU" sz="1600" dirty="0" smtClean="0">
+                  <a:latin typeface="Consolas" panose="020B0609020204030204" pitchFamily="49" charset="0"/>
+                </a:rPr>
+                <a:t>data table</a:t>
+              </a:r>
+              <a:endParaRPr lang="en-AU" sz="1600" dirty="0">
+                <a:latin typeface="Consolas" panose="020B0609020204030204" pitchFamily="49" charset="0"/>
+              </a:endParaRPr>
+            </a:p>
+          </p:txBody>
+        </p:sp>
+        <p:sp>
+          <p:nvSpPr>
+            <p:cNvPr id="111" name="Rectangle 110"/>
+            <p:cNvSpPr/>
+            <p:nvPr/>
+          </p:nvSpPr>
+          <p:spPr>
+            <a:xfrm>
+              <a:off x="10235184" y="4724844"/>
+              <a:ext cx="1534602" cy="723568"/>
+            </a:xfrm>
+            <a:prstGeom prst="rect">
+              <a:avLst/>
+            </a:prstGeom>
+            <a:solidFill>
+              <a:srgbClr val="FFC000"/>
+            </a:solidFill>
+          </p:spPr>
+          <p:style>
+            <a:lnRef idx="2">
+              <a:schemeClr val="accent1">
+                <a:shade val="50000"/>
+              </a:schemeClr>
+            </a:lnRef>
+            <a:fillRef idx="1">
+              <a:schemeClr val="accent1"/>
+            </a:fillRef>
+            <a:effectRef idx="0">
+              <a:schemeClr val="accent1"/>
+            </a:effectRef>
+            <a:fontRef idx="minor">
+              <a:schemeClr val="lt1"/>
+            </a:fontRef>
+          </p:style>
+          <p:txBody>
+            <a:bodyPr rtlCol="0" anchor="ctr"/>
+            <a:lstStyle/>
+            <a:p>
+              <a:pPr algn="ctr"/>
+              <a:endParaRPr lang="en-AU"/>
+            </a:p>
+          </p:txBody>
+        </p:sp>
+        <p:sp>
+          <p:nvSpPr>
+            <p:cNvPr id="112" name="TextBox 111"/>
+            <p:cNvSpPr txBox="1"/>
+            <p:nvPr/>
+          </p:nvSpPr>
+          <p:spPr>
+            <a:xfrm>
+              <a:off x="10598292" y="4886982"/>
+              <a:ext cx="1041621" cy="338554"/>
+            </a:xfrm>
+            <a:prstGeom prst="rect">
+              <a:avLst/>
+            </a:prstGeom>
+            <a:noFill/>
+          </p:spPr>
+          <p:txBody>
+            <a:bodyPr wrap="square" rtlCol="0">
+              <a:spAutoFit/>
+            </a:bodyPr>
+            <a:lstStyle/>
+            <a:p>
+              <a:r>
+                <a:rPr lang="en-AU" sz="1600" dirty="0" smtClean="0">
+                  <a:latin typeface="Consolas" panose="020B0609020204030204" pitchFamily="49" charset="0"/>
+                </a:rPr>
+                <a:t>graph</a:t>
+              </a:r>
+              <a:endParaRPr lang="en-AU" sz="1600" dirty="0">
+                <a:latin typeface="Consolas" panose="020B0609020204030204" pitchFamily="49" charset="0"/>
+              </a:endParaRPr>
+            </a:p>
+          </p:txBody>
+        </p:sp>
+        <p:cxnSp>
+          <p:nvCxnSpPr>
+            <p:cNvPr id="119" name="Straight Arrow Connector 118"/>
+            <p:cNvCxnSpPr/>
+            <p:nvPr/>
+          </p:nvCxnSpPr>
+          <p:spPr>
+            <a:xfrm flipH="1">
+              <a:off x="7122160" y="3720833"/>
+              <a:ext cx="548304" cy="631305"/>
+            </a:xfrm>
+            <a:prstGeom prst="straightConnector1">
+              <a:avLst/>
+            </a:prstGeom>
+            <a:ln>
+              <a:solidFill>
+                <a:schemeClr val="tx1"/>
+              </a:solidFill>
+              <a:tailEnd type="triangle"/>
+            </a:ln>
+          </p:spPr>
+          <p:style>
+            <a:lnRef idx="1">
+              <a:schemeClr val="accent1"/>
+            </a:lnRef>
+            <a:fillRef idx="0">
+              <a:schemeClr val="accent1"/>
+            </a:fillRef>
+            <a:effectRef idx="0">
+              <a:schemeClr val="accent1"/>
+            </a:effectRef>
+            <a:fontRef idx="minor">
+              <a:schemeClr val="tx1"/>
+            </a:fontRef>
+          </p:style>
+        </p:cxnSp>
+        <p:cxnSp>
+          <p:nvCxnSpPr>
+            <p:cNvPr id="121" name="Straight Arrow Connector 120"/>
+            <p:cNvCxnSpPr>
+              <a:endCxn id="83" idx="3"/>
+            </p:cNvCxnSpPr>
+            <p:nvPr/>
+          </p:nvCxnSpPr>
+          <p:spPr>
+            <a:xfrm flipH="1">
+              <a:off x="7099936" y="4479631"/>
+              <a:ext cx="587510" cy="3213"/>
+            </a:xfrm>
+            <a:prstGeom prst="straightConnector1">
+              <a:avLst/>
+            </a:prstGeom>
+            <a:ln>
+              <a:solidFill>
+                <a:schemeClr val="tx1"/>
+              </a:solidFill>
+              <a:tailEnd type="triangle"/>
+            </a:ln>
+          </p:spPr>
+          <p:style>
+            <a:lnRef idx="1">
+              <a:schemeClr val="accent1"/>
+            </a:lnRef>
+            <a:fillRef idx="0">
+              <a:schemeClr val="accent1"/>
+            </a:fillRef>
+            <a:effectRef idx="0">
+              <a:schemeClr val="accent1"/>
+            </a:effectRef>
+            <a:fontRef idx="minor">
+              <a:schemeClr val="tx1"/>
+            </a:fontRef>
+          </p:style>
+        </p:cxnSp>
+        <p:cxnSp>
+          <p:nvCxnSpPr>
+            <p:cNvPr id="124" name="Straight Arrow Connector 123"/>
+            <p:cNvCxnSpPr/>
+            <p:nvPr/>
+          </p:nvCxnSpPr>
+          <p:spPr>
+            <a:xfrm flipH="1" flipV="1">
+              <a:off x="7108349" y="4613550"/>
+              <a:ext cx="595923" cy="803171"/>
+            </a:xfrm>
+            <a:prstGeom prst="straightConnector1">
+              <a:avLst/>
+            </a:prstGeom>
+            <a:ln>
+              <a:solidFill>
+                <a:schemeClr val="tx1"/>
+              </a:solidFill>
+              <a:tailEnd type="triangle"/>
+            </a:ln>
+          </p:spPr>
+          <p:style>
+            <a:lnRef idx="1">
+              <a:schemeClr val="accent1"/>
+            </a:lnRef>
+            <a:fillRef idx="0">
+              <a:schemeClr val="accent1"/>
+            </a:fillRef>
+            <a:effectRef idx="0">
+              <a:schemeClr val="accent1"/>
+            </a:effectRef>
+            <a:fontRef idx="minor">
+              <a:schemeClr val="tx1"/>
+            </a:fontRef>
+          </p:style>
+        </p:cxnSp>
+        <p:cxnSp>
+          <p:nvCxnSpPr>
+            <p:cNvPr id="133" name="Straight Arrow Connector 132"/>
+            <p:cNvCxnSpPr/>
+            <p:nvPr/>
+          </p:nvCxnSpPr>
+          <p:spPr>
+            <a:xfrm flipH="1" flipV="1">
+              <a:off x="9331960" y="3580737"/>
+              <a:ext cx="835360" cy="249760"/>
+            </a:xfrm>
+            <a:prstGeom prst="straightConnector1">
+              <a:avLst/>
+            </a:prstGeom>
+            <a:ln>
+              <a:solidFill>
+                <a:schemeClr val="tx1"/>
+              </a:solidFill>
+              <a:tailEnd type="triangle"/>
+            </a:ln>
+          </p:spPr>
+          <p:style>
+            <a:lnRef idx="1">
+              <a:schemeClr val="accent1"/>
+            </a:lnRef>
+            <a:fillRef idx="0">
+              <a:schemeClr val="accent1"/>
+            </a:fillRef>
+            <a:effectRef idx="0">
+              <a:schemeClr val="accent1"/>
+            </a:effectRef>
+            <a:fontRef idx="minor">
+              <a:schemeClr val="tx1"/>
+            </a:fontRef>
+          </p:style>
+        </p:cxnSp>
+        <p:cxnSp>
+          <p:nvCxnSpPr>
+            <p:cNvPr id="134" name="Straight Arrow Connector 133"/>
+            <p:cNvCxnSpPr/>
+            <p:nvPr/>
+          </p:nvCxnSpPr>
+          <p:spPr>
+            <a:xfrm flipH="1">
+              <a:off x="9321065" y="3957346"/>
+              <a:ext cx="846255" cy="499359"/>
+            </a:xfrm>
+            <a:prstGeom prst="straightConnector1">
+              <a:avLst/>
+            </a:prstGeom>
+            <a:ln>
+              <a:solidFill>
+                <a:schemeClr val="tx1"/>
+              </a:solidFill>
+              <a:tailEnd type="triangle"/>
+            </a:ln>
+          </p:spPr>
+          <p:style>
+            <a:lnRef idx="1">
+              <a:schemeClr val="accent1"/>
+            </a:lnRef>
+            <a:fillRef idx="0">
+              <a:schemeClr val="accent1"/>
+            </a:fillRef>
+            <a:effectRef idx="0">
+              <a:schemeClr val="accent1"/>
+            </a:effectRef>
+            <a:fontRef idx="minor">
+              <a:schemeClr val="tx1"/>
+            </a:fontRef>
+          </p:style>
+        </p:cxnSp>
+        <p:cxnSp>
+          <p:nvCxnSpPr>
+            <p:cNvPr id="136" name="Straight Arrow Connector 135"/>
+            <p:cNvCxnSpPr/>
+            <p:nvPr/>
+          </p:nvCxnSpPr>
+          <p:spPr>
+            <a:xfrm flipH="1">
+              <a:off x="9331958" y="4054631"/>
+              <a:ext cx="846255" cy="1317945"/>
+            </a:xfrm>
+            <a:prstGeom prst="straightConnector1">
+              <a:avLst/>
+            </a:prstGeom>
+            <a:ln>
+              <a:solidFill>
+                <a:schemeClr val="tx1"/>
+              </a:solidFill>
+              <a:tailEnd type="triangle"/>
+            </a:ln>
+          </p:spPr>
+          <p:style>
+            <a:lnRef idx="1">
+              <a:schemeClr val="accent1"/>
+            </a:lnRef>
+            <a:fillRef idx="0">
+              <a:schemeClr val="accent1"/>
+            </a:fillRef>
+            <a:effectRef idx="0">
+              <a:schemeClr val="accent1"/>
+            </a:effectRef>
+            <a:fontRef idx="minor">
+              <a:schemeClr val="tx1"/>
+            </a:fontRef>
+          </p:style>
+        </p:cxnSp>
+        <p:cxnSp>
+          <p:nvCxnSpPr>
+            <p:cNvPr id="141" name="Straight Arrow Connector 140"/>
+            <p:cNvCxnSpPr/>
+            <p:nvPr/>
+          </p:nvCxnSpPr>
+          <p:spPr>
+            <a:xfrm flipH="1" flipV="1">
+              <a:off x="9331958" y="3757855"/>
+              <a:ext cx="846255" cy="1159085"/>
+            </a:xfrm>
+            <a:prstGeom prst="straightConnector1">
+              <a:avLst/>
+            </a:prstGeom>
+            <a:ln>
+              <a:solidFill>
+                <a:schemeClr val="tx1"/>
+              </a:solidFill>
+              <a:tailEnd type="triangle"/>
+            </a:ln>
+          </p:spPr>
+          <p:style>
+            <a:lnRef idx="1">
+              <a:schemeClr val="accent1"/>
+            </a:lnRef>
+            <a:fillRef idx="0">
+              <a:schemeClr val="accent1"/>
+            </a:fillRef>
+            <a:effectRef idx="0">
+              <a:schemeClr val="accent1"/>
+            </a:effectRef>
+            <a:fontRef idx="minor">
+              <a:schemeClr val="tx1"/>
+            </a:fontRef>
+          </p:style>
+        </p:cxnSp>
+        <p:cxnSp>
+          <p:nvCxnSpPr>
+            <p:cNvPr id="143" name="Straight Arrow Connector 142"/>
+            <p:cNvCxnSpPr/>
+            <p:nvPr/>
+          </p:nvCxnSpPr>
+          <p:spPr>
+            <a:xfrm flipH="1" flipV="1">
+              <a:off x="9321065" y="4587291"/>
+              <a:ext cx="846255" cy="455241"/>
+            </a:xfrm>
+            <a:prstGeom prst="straightConnector1">
+              <a:avLst/>
+            </a:prstGeom>
+            <a:ln>
+              <a:solidFill>
+                <a:schemeClr val="tx1"/>
+              </a:solidFill>
+              <a:tailEnd type="triangle"/>
+            </a:ln>
+          </p:spPr>
+          <p:style>
+            <a:lnRef idx="1">
+              <a:schemeClr val="accent1"/>
+            </a:lnRef>
+            <a:fillRef idx="0">
+              <a:schemeClr val="accent1"/>
+            </a:fillRef>
+            <a:effectRef idx="0">
+              <a:schemeClr val="accent1"/>
+            </a:effectRef>
+            <a:fontRef idx="minor">
+              <a:schemeClr val="tx1"/>
+            </a:fontRef>
+          </p:style>
+        </p:cxnSp>
+        <p:cxnSp>
+          <p:nvCxnSpPr>
+            <p:cNvPr id="147" name="Straight Arrow Connector 146"/>
+            <p:cNvCxnSpPr/>
+            <p:nvPr/>
+          </p:nvCxnSpPr>
+          <p:spPr>
+            <a:xfrm flipH="1">
+              <a:off x="9337890" y="5195233"/>
+              <a:ext cx="829430" cy="274628"/>
+            </a:xfrm>
+            <a:prstGeom prst="straightConnector1">
+              <a:avLst/>
+            </a:prstGeom>
+            <a:ln>
+              <a:solidFill>
+                <a:schemeClr val="tx1"/>
+              </a:solidFill>
+              <a:tailEnd type="triangle"/>
+            </a:ln>
+          </p:spPr>
+          <p:style>
+            <a:lnRef idx="1">
+              <a:schemeClr val="accent1"/>
+            </a:lnRef>
+            <a:fillRef idx="0">
+              <a:schemeClr val="accent1"/>
+            </a:fillRef>
+            <a:effectRef idx="0">
+              <a:schemeClr val="accent1"/>
+            </a:effectRef>
+            <a:fontRef idx="minor">
+              <a:schemeClr val="tx1"/>
+            </a:fontRef>
+          </p:style>
+        </p:cxnSp>
+        <p:sp>
+          <p:nvSpPr>
+            <p:cNvPr id="149" name="TextBox 148"/>
+            <p:cNvSpPr txBox="1"/>
+            <p:nvPr/>
+          </p:nvSpPr>
+          <p:spPr>
+            <a:xfrm>
+              <a:off x="6087110" y="2057122"/>
+              <a:ext cx="4432300" cy="461665"/>
+            </a:xfrm>
+            <a:prstGeom prst="rect">
+              <a:avLst/>
+            </a:prstGeom>
+            <a:noFill/>
+          </p:spPr>
+          <p:txBody>
+            <a:bodyPr wrap="square" rtlCol="0">
+              <a:spAutoFit/>
+            </a:bodyPr>
+            <a:lstStyle/>
+            <a:p>
+              <a:r>
+                <a:rPr lang="en-AU" sz="2400" dirty="0" smtClean="0"/>
+                <a:t>Interactive data explorer structure</a:t>
+              </a:r>
+              <a:endParaRPr lang="en-AU" sz="2400" dirty="0"/>
+            </a:p>
+          </p:txBody>
+        </p:sp>
+        <p:sp>
+          <p:nvSpPr>
+            <p:cNvPr id="151" name="Rectangle 150"/>
+            <p:cNvSpPr/>
+            <p:nvPr/>
+          </p:nvSpPr>
+          <p:spPr>
+            <a:xfrm>
+              <a:off x="5356861" y="2057122"/>
+              <a:ext cx="6591300" cy="3951248"/>
+            </a:xfrm>
+            <a:prstGeom prst="rect">
+              <a:avLst/>
+            </a:prstGeom>
+            <a:solidFill>
+              <a:schemeClr val="accent1">
+                <a:alpha val="5000"/>
+              </a:schemeClr>
+            </a:solidFill>
+            <a:ln>
+              <a:solidFill>
+                <a:schemeClr val="accent1">
+                  <a:shade val="50000"/>
+                  <a:alpha val="99000"/>
+                </a:schemeClr>
+              </a:solidFill>
+            </a:ln>
+          </p:spPr>
+          <p:style>
+            <a:lnRef idx="2">
+              <a:schemeClr val="accent1">
+                <a:shade val="50000"/>
+              </a:schemeClr>
+            </a:lnRef>
+            <a:fillRef idx="1">
+              <a:schemeClr val="accent1"/>
+            </a:fillRef>
+            <a:effectRef idx="0">
+              <a:schemeClr val="accent1"/>
+            </a:effectRef>
+            <a:fontRef idx="minor">
+              <a:schemeClr val="lt1"/>
+            </a:fontRef>
+          </p:style>
+          <p:txBody>
+            <a:bodyPr rtlCol="0" anchor="ctr"/>
+            <a:lstStyle/>
+            <a:p>
+              <a:pPr algn="ctr"/>
+              <a:endParaRPr lang="en-AU"/>
+            </a:p>
+          </p:txBody>
+        </p:sp>
+        <p:sp>
+          <p:nvSpPr>
+            <p:cNvPr id="154" name="TextBox 153"/>
+            <p:cNvSpPr txBox="1"/>
+            <p:nvPr/>
+          </p:nvSpPr>
+          <p:spPr>
+            <a:xfrm>
+              <a:off x="6709343" y="3531438"/>
+              <a:ext cx="934837" cy="276999"/>
+            </a:xfrm>
+            <a:prstGeom prst="rect">
+              <a:avLst/>
+            </a:prstGeom>
+            <a:noFill/>
+          </p:spPr>
+          <p:txBody>
+            <a:bodyPr wrap="square" rtlCol="0">
+              <a:spAutoFit/>
+            </a:bodyPr>
+            <a:lstStyle/>
+            <a:p>
+              <a:r>
+                <a:rPr lang="en-AU" sz="1200" i="1" dirty="0" smtClean="0"/>
+                <a:t>dependency</a:t>
+              </a:r>
+              <a:endParaRPr lang="en-AU" i="1" dirty="0"/>
+            </a:p>
+          </p:txBody>
+        </p:sp>
+        <p:sp>
+          <p:nvSpPr>
+            <p:cNvPr id="155" name="TextBox 154"/>
+            <p:cNvSpPr txBox="1"/>
+            <p:nvPr/>
+          </p:nvSpPr>
+          <p:spPr>
+            <a:xfrm>
+              <a:off x="9353934" y="3265674"/>
+              <a:ext cx="934837" cy="276999"/>
+            </a:xfrm>
+            <a:prstGeom prst="rect">
+              <a:avLst/>
+            </a:prstGeom>
+            <a:noFill/>
+          </p:spPr>
+          <p:txBody>
+            <a:bodyPr wrap="square" rtlCol="0">
+              <a:spAutoFit/>
+            </a:bodyPr>
+            <a:lstStyle/>
+            <a:p>
+              <a:r>
+                <a:rPr lang="en-AU" sz="1200" i="1" dirty="0" smtClean="0"/>
+                <a:t>dependency</a:t>
+              </a:r>
+              <a:endParaRPr lang="en-AU" i="1" dirty="0"/>
+            </a:p>
+          </p:txBody>
+        </p:sp>
+      </p:grpSp>
+      <p:sp>
+        <p:nvSpPr>
+          <p:cNvPr id="168" name="TextBox 167"/>
+          <p:cNvSpPr txBox="1"/>
+          <p:nvPr/>
+        </p:nvSpPr>
+        <p:spPr>
+          <a:xfrm>
+            <a:off x="748669" y="6226895"/>
+            <a:ext cx="10698479" cy="646331"/>
+          </a:xfrm>
+          <a:prstGeom prst="rect">
+            <a:avLst/>
+          </a:prstGeom>
+          <a:noFill/>
+        </p:spPr>
+        <p:txBody>
+          <a:bodyPr wrap="square" rtlCol="0">
+            <a:spAutoFit/>
+          </a:bodyPr>
+          <a:lstStyle/>
+          <a:p>
+            <a:r>
+              <a:rPr lang="en-AU" dirty="0"/>
+              <a:t>Load up </a:t>
+            </a:r>
+            <a:r>
+              <a:rPr lang="en-AU" dirty="0" smtClean="0">
+                <a:latin typeface="Consolas" panose="020B0609020204030204" pitchFamily="49" charset="0"/>
+                <a:cs typeface="Courier New" panose="02070309020205020404" pitchFamily="49" charset="0"/>
+              </a:rPr>
+              <a:t>lesson3_interactive_data_explorer/lesson3_interactive_data_explorer.R</a:t>
+            </a:r>
+            <a:r>
+              <a:rPr lang="en-AU" dirty="0" smtClean="0">
+                <a:cs typeface="Courier New" panose="02070309020205020404" pitchFamily="49" charset="0"/>
+              </a:rPr>
+              <a:t> </a:t>
+            </a:r>
+            <a:r>
+              <a:rPr lang="en-AU" dirty="0">
+                <a:cs typeface="Courier New" panose="02070309020205020404" pitchFamily="49" charset="0"/>
+              </a:rPr>
+              <a:t>in </a:t>
+            </a:r>
+            <a:r>
+              <a:rPr lang="en-AU" dirty="0" err="1">
+                <a:cs typeface="Courier New" panose="02070309020205020404" pitchFamily="49" charset="0"/>
+              </a:rPr>
+              <a:t>Rstudio</a:t>
+            </a:r>
+            <a:endParaRPr lang="en-AU" dirty="0">
+              <a:cs typeface="Courier New" panose="02070309020205020404" pitchFamily="49" charset="0"/>
+            </a:endParaRPr>
+          </a:p>
+          <a:p>
+            <a:endParaRPr lang="en-AU" dirty="0"/>
+          </a:p>
+        </p:txBody>
+      </p:sp>
+    </p:spTree>
+    <p:extLst>
+      <p:ext uri="{BB962C8B-B14F-4D97-AF65-F5344CB8AC3E}">
+        <p14:creationId xmlns:p14="http://schemas.microsoft.com/office/powerpoint/2010/main" val="1355707650"/>
+      </p:ext>
+    </p:extLst>
+  </p:cSld>
+  <p:clrMapOvr>
+    <a:masterClrMapping/>
+  </p:clrMapOvr>
+</p:sld>
+</file>
+
+<file path=ppt/slides/slide14.xml><?xml version="1.0" encoding="utf-8"?>
+<p:sld xmlns:a="http://schemas.openxmlformats.org/drawingml/2006/main" xmlns:r="http://schemas.openxmlformats.org/officeDocument/2006/relationships" xmlns:p="http://schemas.openxmlformats.org/presentationml/2006/main">
+  <p:cSld>
+    <p:spTree>
+      <p:nvGrpSpPr>
+        <p:cNvPr id="1" name=""/>
+        <p:cNvGrpSpPr/>
+        <p:nvPr/>
+      </p:nvGrpSpPr>
+      <p:grpSpPr>
+        <a:xfrm>
+          <a:off x="0" y="0"/>
+          <a:ext cx="0" cy="0"/>
+          <a:chOff x="0" y="0"/>
+          <a:chExt cx="0" cy="0"/>
+        </a:xfrm>
+      </p:grpSpPr>
+      <p:sp>
+        <p:nvSpPr>
+          <p:cNvPr id="2" name="Title 1"/>
+          <p:cNvSpPr>
+            <a:spLocks noGrp="1"/>
+          </p:cNvSpPr>
+          <p:nvPr>
+            <p:ph type="title"/>
+          </p:nvPr>
+        </p:nvSpPr>
+        <p:spPr/>
+        <p:txBody>
+          <a:bodyPr/>
+          <a:lstStyle/>
+          <a:p>
+            <a:r>
+              <a:rPr lang="en-AU" dirty="0" smtClean="0"/>
+              <a:t>Thank you! Hope you </a:t>
+            </a:r>
+            <a:r>
+              <a:rPr lang="en-AU" smtClean="0"/>
+              <a:t>learned something</a:t>
+            </a:r>
+            <a:endParaRPr lang="en-AU" dirty="0"/>
+          </a:p>
+        </p:txBody>
+      </p:sp>
+      <p:sp>
+        <p:nvSpPr>
+          <p:cNvPr id="3" name="Content Placeholder 2"/>
+          <p:cNvSpPr>
+            <a:spLocks noGrp="1"/>
+          </p:cNvSpPr>
+          <p:nvPr>
+            <p:ph idx="1"/>
+          </p:nvPr>
+        </p:nvSpPr>
+        <p:spPr/>
+        <p:txBody>
+          <a:bodyPr/>
+          <a:lstStyle/>
+          <a:p>
+            <a:r>
+              <a:rPr lang="en-AU" dirty="0" smtClean="0"/>
+              <a:t>These slides and all the code is available on GitHub:</a:t>
+            </a:r>
+          </a:p>
+          <a:p>
+            <a:pPr lvl="1"/>
+            <a:r>
+              <a:rPr lang="en-AU" dirty="0">
+                <a:hlinkClick r:id="rId3"/>
+              </a:rPr>
+              <a:t>https://</a:t>
+            </a:r>
+            <a:r>
+              <a:rPr lang="en-AU" dirty="0" smtClean="0">
+                <a:hlinkClick r:id="rId3"/>
+              </a:rPr>
+              <a:t>github.com/jamesrlawson/ShinyWorkshop_ResBazSydney2018</a:t>
+            </a:r>
+            <a:endParaRPr lang="en-AU" dirty="0" smtClean="0"/>
+          </a:p>
+          <a:p>
+            <a:r>
+              <a:rPr lang="en-AU" dirty="0" smtClean="0"/>
+              <a:t>Enjoy the rest of </a:t>
+            </a:r>
+            <a:r>
+              <a:rPr lang="en-AU" dirty="0" err="1" smtClean="0"/>
+              <a:t>RezBaz</a:t>
+            </a:r>
+            <a:r>
+              <a:rPr lang="en-AU" dirty="0" smtClean="0"/>
+              <a:t> Sydney 2018 – say hi if you see me around </a:t>
+            </a:r>
+            <a:r>
+              <a:rPr lang="en-AU" dirty="0" smtClean="0">
+                <a:sym typeface="Wingdings" panose="05000000000000000000" pitchFamily="2" charset="2"/>
+              </a:rPr>
+              <a:t></a:t>
+            </a:r>
+            <a:endParaRPr lang="en-AU" dirty="0" smtClean="0"/>
+          </a:p>
+          <a:p>
+            <a:r>
+              <a:rPr lang="en-AU" dirty="0" smtClean="0"/>
+              <a:t>Come and chat if you need help, or have ideas you’d like to discuss</a:t>
+            </a:r>
+          </a:p>
+          <a:p>
+            <a:r>
+              <a:rPr lang="en-AU" dirty="0" smtClean="0"/>
+              <a:t>Or find me online:</a:t>
+            </a:r>
+          </a:p>
+          <a:p>
+            <a:pPr lvl="1"/>
+            <a:r>
+              <a:rPr lang="en-AU" dirty="0" smtClean="0">
+                <a:hlinkClick r:id="rId4"/>
+              </a:rPr>
+              <a:t>james.r.lawson.nz@gmail.com</a:t>
+            </a:r>
+            <a:endParaRPr lang="en-AU" dirty="0" smtClean="0"/>
+          </a:p>
+          <a:p>
+            <a:pPr lvl="1"/>
+            <a:r>
+              <a:rPr lang="en-AU" dirty="0" smtClean="0">
+                <a:hlinkClick r:id="rId5"/>
+              </a:rPr>
+              <a:t>https://github.com/jamesrlawson</a:t>
+            </a:r>
+            <a:endParaRPr lang="en-AU" dirty="0" smtClean="0"/>
+          </a:p>
+          <a:p>
+            <a:pPr lvl="1"/>
+            <a:r>
+              <a:rPr lang="en-AU" dirty="0" smtClean="0">
+                <a:hlinkClick r:id="rId6"/>
+              </a:rPr>
+              <a:t>https://jamesrlawson.netlify.com</a:t>
+            </a:r>
+            <a:endParaRPr lang="en-AU" dirty="0" smtClean="0"/>
+          </a:p>
+          <a:p>
+            <a:pPr lvl="1"/>
+            <a:endParaRPr lang="en-AU" dirty="0"/>
+          </a:p>
+        </p:txBody>
+      </p:sp>
+    </p:spTree>
+    <p:extLst>
+      <p:ext uri="{BB962C8B-B14F-4D97-AF65-F5344CB8AC3E}">
+        <p14:creationId xmlns:p14="http://schemas.microsoft.com/office/powerpoint/2010/main" val="1104838791"/>
+      </p:ext>
+    </p:extLst>
+  </p:cSld>
+  <p:clrMapOvr>
+    <a:masterClrMapping/>
+  </p:clrMapOvr>
+</p:sld>
+</file>
+
 <file path=ppt/slides/slide2.xml><?xml version="1.0" encoding="utf-8"?>
 <p:sld xmlns:a="http://schemas.openxmlformats.org/drawingml/2006/main" xmlns:r="http://schemas.openxmlformats.org/officeDocument/2006/relationships" xmlns:p="http://schemas.openxmlformats.org/presentationml/2006/main">
   <p:cSld>
@@ -4734,15 +7113,7 @@
           <a:p>
             <a:r>
               <a:rPr lang="en-AU" dirty="0" smtClean="0"/>
-              <a:t>Wa</a:t>
-            </a:r>
-            <a:r>
-              <a:rPr lang="en-AU" dirty="0" smtClean="0"/>
-              <a:t>lk through some basic</a:t>
-            </a:r>
-            <a:r>
-              <a:rPr lang="en-AU" dirty="0" smtClean="0"/>
-              <a:t> </a:t>
+              <a:t>Walk through some basic </a:t>
             </a:r>
             <a:r>
               <a:rPr lang="en-AU" dirty="0" smtClean="0">
@@ -4770,14 +7141,7 @@
                 <a:latin typeface="Consolas" panose="020B0609020204030204" pitchFamily="49" charset="0"/>
                 <a:cs typeface="Courier New" panose="02070309020205020404" pitchFamily="49" charset="0"/>
               </a:rPr>
-              <a:t>Create </a:t>
-            </a:r>
-            <a:r>
-              <a:rPr lang="en-AU" dirty="0" smtClean="0">
-                <a:latin typeface="Consolas" panose="020B0609020204030204" pitchFamily="49" charset="0"/>
-                <a:cs typeface="Courier New" panose="02070309020205020404" pitchFamily="49" charset="0"/>
-              </a:rPr>
-              <a:t>interactivity with reactive programming</a:t>
+              <a:t>Create interactivity with reactive programming</a:t>
             </a:r>
             <a:endParaRPr lang="en-AU" dirty="0">
               <a:latin typeface="Consolas" panose="020B0609020204030204" pitchFamily="49" charset="0"/>

</xml_diff>

<commit_message>
made change to a slide
</commit_message>
<xml_diff>
--- a/slides/Shiny_ResBazSydney2018.pptx
+++ b/slides/Shiny_ResBazSydney2018.pptx
@@ -4439,14 +4439,7 @@
                 <a:latin typeface="Consolas" panose="020B0609020204030204" pitchFamily="49" charset="0"/>
                 <a:cs typeface="Courier New" panose="02070309020205020404" pitchFamily="49" charset="0"/>
               </a:rPr>
-              <a:t>lesson2_basic_data_explorer/ </a:t>
-            </a:r>
-            <a:r>
-              <a:rPr lang="en-AU" dirty="0" smtClean="0">
-                <a:latin typeface="Consolas" panose="020B0609020204030204" pitchFamily="49" charset="0"/>
-                <a:cs typeface="Courier New" panose="02070309020205020404" pitchFamily="49" charset="0"/>
-              </a:rPr>
-              <a:t>lesson2_basic_data_explorer_TEMPLATE.R</a:t>
+              <a:t>lesson2_basic_data_explorer/ lesson2_basic_data_explorer_TEMPLATE.R</a:t>
             </a:r>
             <a:r>
               <a:rPr lang="en-AU" dirty="0" smtClean="0">
@@ -4473,11 +4466,7 @@
           <a:p>
             <a:r>
               <a:rPr lang="en-AU" dirty="0" smtClean="0"/>
-              <a:t>We’ll build our first app</a:t>
-            </a:r>
-            <a:r>
-              <a:rPr lang="en-AU" dirty="0" smtClean="0"/>
-              <a:t>!</a:t>
+              <a:t>We’ll build our first app!</a:t>
             </a:r>
           </a:p>
           <a:p>
@@ -4493,7 +4482,6 @@
               <a:rPr lang="en-AU" dirty="0"/>
               <a:t>add functionality to select a variable to colour points or change point shapes</a:t>
             </a:r>
-            <a:endParaRPr lang="en-AU" dirty="0"/>
           </a:p>
         </p:txBody>
       </p:sp>
@@ -6781,23 +6769,43 @@
           <a:p>
             <a:r>
               <a:rPr lang="en-AU" dirty="0" smtClean="0"/>
-              <a:t>Slides and lessons for the morning are on GitHub</a:t>
-            </a:r>
+              <a:t>Slides and lessons for the morning are </a:t>
+            </a:r>
+            <a:r>
+              <a:rPr lang="en-AU" smtClean="0"/>
+              <a:t>on </a:t>
+            </a:r>
+            <a:r>
+              <a:rPr lang="en-AU" smtClean="0"/>
+              <a:t>GitHub</a:t>
+            </a:r>
+            <a:endParaRPr lang="en-AU" dirty="0" smtClean="0"/>
           </a:p>
           <a:p>
             <a:pPr lvl="1"/>
+            <a:r>
+              <a:rPr lang="en-AU" dirty="0">
+                <a:hlinkClick r:id="rId2"/>
+              </a:rPr>
+              <a:t>https://</a:t>
+            </a:r>
             <a:r>
               <a:rPr lang="en-AU" dirty="0" smtClean="0">
                 <a:hlinkClick r:id="rId2"/>
               </a:rPr>
-              <a:t>https://github.com/jamesrlawson/ShinyWorkshop_ResBazSydney2018</a:t>
+              <a:t>github.com/jamesrlawson/ShinyWorkshop_ResBazSydney2018/raw/master/ResBaz2018_shiny.zip</a:t>
             </a:r>
             <a:endParaRPr lang="en-AU" dirty="0" smtClean="0"/>
           </a:p>
           <a:p>
+            <a:pPr lvl="1"/>
             <a:r>
               <a:rPr lang="en-AU" dirty="0" smtClean="0"/>
-              <a:t>We’ll be using </a:t>
+              <a:t>We’ll </a:t>
+            </a:r>
+            <a:r>
+              <a:rPr lang="en-AU" dirty="0" smtClean="0"/>
+              <a:t>be using </a:t>
             </a:r>
             <a:r>
               <a:rPr lang="en-AU" dirty="0" err="1" smtClean="0"/>

</xml_diff>